<commit_message>
Function and Random number,
</commit_message>
<xml_diff>
--- a/15_Ch01_Intro.pptx
+++ b/15_Ch01_Intro.pptx
@@ -3678,7 +3678,7 @@
         <p:spPr>
           <a:xfrm>
             <a:off x="467544" y="1340768"/>
-            <a:ext cx="8352928" cy="1008112"/>
+            <a:ext cx="8352928" cy="1296328"/>
           </a:xfrm>
           <a:ln>
             <a:solidFill>
@@ -3742,7 +3742,7 @@
                   <a:schemeClr val="tx1"/>
                 </a:solidFill>
               </a:rPr>
-              <a:t>It is lower level language and super fast like C++ for web development.</a:t>
+              <a:t>It is lower level language and super fast like C++ with defined data type for web development.</a:t>
             </a:r>
           </a:p>
         </p:txBody>
@@ -3878,7 +3878,7 @@
         </p:blipFill>
         <p:spPr bwMode="auto">
           <a:xfrm>
-            <a:off x="971600" y="2492896"/>
+            <a:off x="1115616" y="2755859"/>
             <a:ext cx="6424075" cy="3456200"/>
           </a:xfrm>
           <a:prstGeom prst="rect">
@@ -4462,6 +4462,244 @@
           </a:ln>
         </p:spPr>
       </p:pic>
+      <p:pic>
+        <p:nvPicPr>
+          <p:cNvPr id="8" name="Picture 7">
+            <a:extLst>
+              <a:ext uri="{FF2B5EF4-FFF2-40B4-BE49-F238E27FC236}">
+                <a16:creationId xmlns:a16="http://schemas.microsoft.com/office/drawing/2014/main" id="{7A43C754-B631-42B2-A1B6-D917E0A4E1B7}"/>
+              </a:ext>
+            </a:extLst>
+          </p:cNvPr>
+          <p:cNvPicPr>
+            <a:picLocks noChangeAspect="1"/>
+          </p:cNvPicPr>
+          <p:nvPr/>
+        </p:nvPicPr>
+        <p:blipFill>
+          <a:blip r:embed="rId3"/>
+          <a:stretch>
+            <a:fillRect/>
+          </a:stretch>
+        </p:blipFill>
+        <p:spPr>
+          <a:xfrm>
+            <a:off x="1187624" y="4100360"/>
+            <a:ext cx="3048000" cy="1857375"/>
+          </a:xfrm>
+          <a:prstGeom prst="rect">
+            <a:avLst/>
+          </a:prstGeom>
+        </p:spPr>
+      </p:pic>
+      <p:sp>
+        <p:nvSpPr>
+          <p:cNvPr id="9" name="副標題 2">
+            <a:extLst>
+              <a:ext uri="{FF2B5EF4-FFF2-40B4-BE49-F238E27FC236}">
+                <a16:creationId xmlns:a16="http://schemas.microsoft.com/office/drawing/2014/main" id="{2F195DB5-F8A0-46CD-A83B-C5817CD8AE0F}"/>
+              </a:ext>
+            </a:extLst>
+          </p:cNvPr>
+          <p:cNvSpPr txBox="1">
+            <a:spLocks/>
+          </p:cNvSpPr>
+          <p:nvPr/>
+        </p:nvSpPr>
+        <p:spPr>
+          <a:xfrm>
+            <a:off x="435968" y="2807838"/>
+            <a:ext cx="8352928" cy="432048"/>
+          </a:xfrm>
+          <a:prstGeom prst="rect">
+            <a:avLst/>
+          </a:prstGeom>
+          <a:ln>
+            <a:solidFill>
+              <a:srgbClr val="C00000"/>
+            </a:solidFill>
+          </a:ln>
+        </p:spPr>
+        <p:txBody>
+          <a:bodyPr vert="horz" lIns="91440" tIns="45720" rIns="91440" bIns="45720" rtlCol="0">
+            <a:noAutofit/>
+          </a:bodyPr>
+          <a:lstStyle>
+            <a:lvl1pPr marL="0" indent="0" algn="ctr" defTabSz="914400" rtl="0" eaLnBrk="1" latinLnBrk="0" hangingPunct="1">
+              <a:spcBef>
+                <a:spcPct val="20000"/>
+              </a:spcBef>
+              <a:buFont typeface="Arial" pitchFamily="34" charset="0"/>
+              <a:buNone/>
+              <a:defRPr sz="3200" kern="1200">
+                <a:solidFill>
+                  <a:schemeClr val="tx1">
+                    <a:tint val="75000"/>
+                  </a:schemeClr>
+                </a:solidFill>
+                <a:latin typeface="+mn-lt"/>
+                <a:ea typeface="+mn-ea"/>
+                <a:cs typeface="+mn-cs"/>
+              </a:defRPr>
+            </a:lvl1pPr>
+            <a:lvl2pPr marL="457200" indent="0" algn="ctr" defTabSz="914400" rtl="0" eaLnBrk="1" latinLnBrk="0" hangingPunct="1">
+              <a:spcBef>
+                <a:spcPct val="20000"/>
+              </a:spcBef>
+              <a:buFont typeface="Arial" pitchFamily="34" charset="0"/>
+              <a:buNone/>
+              <a:defRPr sz="2800" kern="1200">
+                <a:solidFill>
+                  <a:schemeClr val="tx1">
+                    <a:tint val="75000"/>
+                  </a:schemeClr>
+                </a:solidFill>
+                <a:latin typeface="+mn-lt"/>
+                <a:ea typeface="+mn-ea"/>
+                <a:cs typeface="+mn-cs"/>
+              </a:defRPr>
+            </a:lvl2pPr>
+            <a:lvl3pPr marL="914400" indent="0" algn="ctr" defTabSz="914400" rtl="0" eaLnBrk="1" latinLnBrk="0" hangingPunct="1">
+              <a:spcBef>
+                <a:spcPct val="20000"/>
+              </a:spcBef>
+              <a:buFont typeface="Arial" pitchFamily="34" charset="0"/>
+              <a:buNone/>
+              <a:defRPr sz="2400" kern="1200">
+                <a:solidFill>
+                  <a:schemeClr val="tx1">
+                    <a:tint val="75000"/>
+                  </a:schemeClr>
+                </a:solidFill>
+                <a:latin typeface="+mn-lt"/>
+                <a:ea typeface="+mn-ea"/>
+                <a:cs typeface="+mn-cs"/>
+              </a:defRPr>
+            </a:lvl3pPr>
+            <a:lvl4pPr marL="1371600" indent="0" algn="ctr" defTabSz="914400" rtl="0" eaLnBrk="1" latinLnBrk="0" hangingPunct="1">
+              <a:spcBef>
+                <a:spcPct val="20000"/>
+              </a:spcBef>
+              <a:buFont typeface="Arial" pitchFamily="34" charset="0"/>
+              <a:buNone/>
+              <a:defRPr sz="2000" kern="1200">
+                <a:solidFill>
+                  <a:schemeClr val="tx1">
+                    <a:tint val="75000"/>
+                  </a:schemeClr>
+                </a:solidFill>
+                <a:latin typeface="+mn-lt"/>
+                <a:ea typeface="+mn-ea"/>
+                <a:cs typeface="+mn-cs"/>
+              </a:defRPr>
+            </a:lvl4pPr>
+            <a:lvl5pPr marL="1828800" indent="0" algn="ctr" defTabSz="914400" rtl="0" eaLnBrk="1" latinLnBrk="0" hangingPunct="1">
+              <a:spcBef>
+                <a:spcPct val="20000"/>
+              </a:spcBef>
+              <a:buFont typeface="Arial" pitchFamily="34" charset="0"/>
+              <a:buNone/>
+              <a:defRPr sz="2000" kern="1200">
+                <a:solidFill>
+                  <a:schemeClr val="tx1">
+                    <a:tint val="75000"/>
+                  </a:schemeClr>
+                </a:solidFill>
+                <a:latin typeface="+mn-lt"/>
+                <a:ea typeface="+mn-ea"/>
+                <a:cs typeface="+mn-cs"/>
+              </a:defRPr>
+            </a:lvl5pPr>
+            <a:lvl6pPr marL="2286000" indent="0" algn="ctr" defTabSz="914400" rtl="0" eaLnBrk="1" latinLnBrk="0" hangingPunct="1">
+              <a:spcBef>
+                <a:spcPct val="20000"/>
+              </a:spcBef>
+              <a:buFont typeface="Arial" pitchFamily="34" charset="0"/>
+              <a:buNone/>
+              <a:defRPr sz="2000" kern="1200">
+                <a:solidFill>
+                  <a:schemeClr val="tx1">
+                    <a:tint val="75000"/>
+                  </a:schemeClr>
+                </a:solidFill>
+                <a:latin typeface="+mn-lt"/>
+                <a:ea typeface="+mn-ea"/>
+                <a:cs typeface="+mn-cs"/>
+              </a:defRPr>
+            </a:lvl6pPr>
+            <a:lvl7pPr marL="2743200" indent="0" algn="ctr" defTabSz="914400" rtl="0" eaLnBrk="1" latinLnBrk="0" hangingPunct="1">
+              <a:spcBef>
+                <a:spcPct val="20000"/>
+              </a:spcBef>
+              <a:buFont typeface="Arial" pitchFamily="34" charset="0"/>
+              <a:buNone/>
+              <a:defRPr sz="2000" kern="1200">
+                <a:solidFill>
+                  <a:schemeClr val="tx1">
+                    <a:tint val="75000"/>
+                  </a:schemeClr>
+                </a:solidFill>
+                <a:latin typeface="+mn-lt"/>
+                <a:ea typeface="+mn-ea"/>
+                <a:cs typeface="+mn-cs"/>
+              </a:defRPr>
+            </a:lvl7pPr>
+            <a:lvl8pPr marL="3200400" indent="0" algn="ctr" defTabSz="914400" rtl="0" eaLnBrk="1" latinLnBrk="0" hangingPunct="1">
+              <a:spcBef>
+                <a:spcPct val="20000"/>
+              </a:spcBef>
+              <a:buFont typeface="Arial" pitchFamily="34" charset="0"/>
+              <a:buNone/>
+              <a:defRPr sz="2000" kern="1200">
+                <a:solidFill>
+                  <a:schemeClr val="tx1">
+                    <a:tint val="75000"/>
+                  </a:schemeClr>
+                </a:solidFill>
+                <a:latin typeface="+mn-lt"/>
+                <a:ea typeface="+mn-ea"/>
+                <a:cs typeface="+mn-cs"/>
+              </a:defRPr>
+            </a:lvl8pPr>
+            <a:lvl9pPr marL="3657600" indent="0" algn="ctr" defTabSz="914400" rtl="0" eaLnBrk="1" latinLnBrk="0" hangingPunct="1">
+              <a:spcBef>
+                <a:spcPct val="20000"/>
+              </a:spcBef>
+              <a:buFont typeface="Arial" pitchFamily="34" charset="0"/>
+              <a:buNone/>
+              <a:defRPr sz="2000" kern="1200">
+                <a:solidFill>
+                  <a:schemeClr val="tx1">
+                    <a:tint val="75000"/>
+                  </a:schemeClr>
+                </a:solidFill>
+                <a:latin typeface="+mn-lt"/>
+                <a:ea typeface="+mn-ea"/>
+                <a:cs typeface="+mn-cs"/>
+              </a:defRPr>
+            </a:lvl9pPr>
+          </a:lstStyle>
+          <a:p>
+            <a:pPr marL="342900" indent="-342900" algn="l">
+              <a:buClr>
+                <a:srgbClr val="0070C0"/>
+              </a:buClr>
+              <a:buSzPct val="80000"/>
+              <a:buFont typeface="Wingdings" pitchFamily="2" charset="2"/>
+              <a:buChar char="u"/>
+            </a:pPr>
+            <a:r>
+              <a:rPr lang="en-US" altLang="zh-TW" sz="1800" b="1" dirty="0">
+                <a:solidFill>
+                  <a:schemeClr val="tx1"/>
+                </a:solidFill>
+                <a:latin typeface="+mj-lt"/>
+              </a:rPr>
+              <a:t>&gt; go get</a:t>
+            </a:r>
+          </a:p>
+        </p:txBody>
+      </p:sp>
     </p:spTree>
     <p:extLst>
       <p:ext uri="{BB962C8B-B14F-4D97-AF65-F5344CB8AC3E}">

</xml_diff>

<commit_message>
Type conversion and type transfer
</commit_message>
<xml_diff>
--- a/15_Ch01_Intro.pptx
+++ b/15_Ch01_Intro.pptx
@@ -3798,7 +3798,7 @@
           <a:p>
             <a:r>
               <a:rPr lang="en-US" altLang="zh-TW" sz="1600" b="1" i="1" dirty="0"/>
-              <a:t>https://www.youtube.com/watch?v=G3PvTWRIhZA&amp;list=PLQVvvaa0QuDeF3hP0wQoSxpkqgRcgxMqX&amp;index=1</a:t>
+              <a:t>ttps://www.youtube.com/watch?v=nSYFfWijl8U&amp;index=2&amp;list=PLQVvvaa0QuDeF3hP0wQoSxpkqgRcgxMqX</a:t>
             </a:r>
           </a:p>
         </p:txBody>
@@ -4081,7 +4081,7 @@
           <a:p>
             <a:r>
               <a:rPr lang="en-US" altLang="zh-TW" sz="1600" b="1" i="1" dirty="0"/>
-              <a:t>https://www.youtube.com/watch?v=G3PvTWRIhZA&amp;list=PLQVvvaa0QuDeF3hP0wQoSxpkqgRcgxMqX&amp;index=1</a:t>
+              <a:t>ttps://www.youtube.com/watch?v=nSYFfWijl8U&amp;index=2&amp;list=PLQVvvaa0QuDeF3hP0wQoSxpkqgRcgxMqX</a:t>
             </a:r>
           </a:p>
         </p:txBody>
@@ -4364,7 +4364,7 @@
           <a:p>
             <a:r>
               <a:rPr lang="en-US" altLang="zh-TW" sz="1600" b="1" i="1" dirty="0"/>
-              <a:t>https://www.youtube.com/watch?v=G3PvTWRIhZA&amp;list=PLQVvvaa0QuDeF3hP0wQoSxpkqgRcgxMqX&amp;index=1</a:t>
+              <a:t>ttps://www.youtube.com/watch?v=nSYFfWijl8U&amp;index=2&amp;list=PLQVvvaa0QuDeF3hP0wQoSxpkqgRcgxMqX</a:t>
             </a:r>
           </a:p>
         </p:txBody>

</xml_diff>